<commit_message>
align third party compiler with other compilers
</commit_message>
<xml_diff>
--- a/overview/images/qa_resources-v4.pptx
+++ b/overview/images/qa_resources-v4.pptx
@@ -238,7 +238,7 @@
               <a:rPr lang="fr-FR" smtClean="0">
                 <a:latin typeface="Calibri Regular" charset="0"/>
               </a:rPr>
-              <a:t>06/11/2025</a:t>
+              <a:t>07/11/2025</a:t>
             </a:fld>
             <a:endParaRPr lang="en-US" dirty="0">
               <a:latin typeface="Calibri Regular" charset="0"/>
@@ -426,7 +426,7 @@
           <a:p>
             <a:fld id="{D125E8DA-58CB-F841-A404-E11EC1E2C988}" type="datetime1">
               <a:rPr lang="fr-FR" smtClean="0"/>
-              <a:t>06/11/2025</a:t>
+              <a:t>07/11/2025</a:t>
             </a:fld>
             <a:endParaRPr lang="en-US" dirty="0"/>
           </a:p>
@@ -43580,8 +43580,8 @@
         </p:nvCxnSpPr>
         <p:spPr>
           <a:xfrm>
-            <a:off x="9113859" y="2450875"/>
-            <a:ext cx="0" cy="831172"/>
+            <a:off x="9113859" y="1790022"/>
+            <a:ext cx="11939" cy="1481488"/>
           </a:xfrm>
           <a:prstGeom prst="straightConnector1">
             <a:avLst/>
@@ -43627,7 +43627,7 @@
         <p:spPr>
           <a:xfrm>
             <a:off x="9110094" y="964985"/>
-            <a:ext cx="3765" cy="1100001"/>
+            <a:ext cx="3765" cy="439148"/>
           </a:xfrm>
           <a:prstGeom prst="straightConnector1">
             <a:avLst/>
@@ -45682,7 +45682,7 @@
         </p:nvSpPr>
         <p:spPr>
           <a:xfrm>
-            <a:off x="8313956" y="2064986"/>
+            <a:off x="8313956" y="1404133"/>
             <a:ext cx="1599805" cy="385889"/>
           </a:xfrm>
           <a:prstGeom prst="roundRect">

</xml_diff>

<commit_message>
update build flow from review
- Native Toolchain instead of third party
- fix .c/.h label
- move microejruntime.a below architecture
</commit_message>
<xml_diff>
--- a/overview/images/qa_resources-v4.pptx
+++ b/overview/images/qa_resources-v4.pptx
@@ -238,7 +238,7 @@
               <a:rPr lang="fr-FR" smtClean="0">
                 <a:latin typeface="Calibri Regular" charset="0"/>
               </a:rPr>
-              <a:t>07/11/2025</a:t>
+              <a:t>12/11/2025</a:t>
             </a:fld>
             <a:endParaRPr lang="en-US" dirty="0">
               <a:latin typeface="Calibri Regular" charset="0"/>
@@ -426,7 +426,7 @@
           <a:p>
             <a:fld id="{D125E8DA-58CB-F841-A404-E11EC1E2C988}" type="datetime1">
               <a:rPr lang="fr-FR" smtClean="0"/>
-              <a:t>07/11/2025</a:t>
+              <a:t>12/11/2025</a:t>
             </a:fld>
             <a:endParaRPr lang="en-US" dirty="0"/>
           </a:p>
@@ -42835,7 +42835,7 @@
         </p:nvSpPr>
         <p:spPr>
           <a:xfrm>
-            <a:off x="4170109" y="3025289"/>
+            <a:off x="2512957" y="2996952"/>
             <a:ext cx="1239442" cy="246221"/>
           </a:xfrm>
           <a:prstGeom prst="rect">
@@ -43037,7 +43037,7 @@
         </p:nvSpPr>
         <p:spPr>
           <a:xfrm>
-            <a:off x="4175788" y="1818765"/>
+            <a:off x="4118826" y="1818484"/>
             <a:ext cx="556563" cy="246221"/>
           </a:xfrm>
           <a:prstGeom prst="rect">
@@ -43175,8 +43175,8 @@
         </p:nvSpPr>
         <p:spPr>
           <a:xfrm>
-            <a:off x="4217751" y="978870"/>
-            <a:ext cx="784189" cy="400110"/>
+            <a:off x="4138136" y="1116357"/>
+            <a:ext cx="513282" cy="246221"/>
           </a:xfrm>
           <a:prstGeom prst="rect">
             <a:avLst/>
@@ -43294,22 +43294,7 @@
                 <a:latin typeface="Source Sans Pro" panose="020B0503030403020204" pitchFamily="34" charset="0"/>
                 <a:ea typeface="Source Sans Pro" panose="020B0503030403020204" pitchFamily="34" charset="0"/>
               </a:rPr>
-              <a:t>(.java, .list, </a:t>
-            </a:r>
-          </a:p>
-          <a:p>
-            <a:pPr>
-              <a:defRPr/>
-            </a:pPr>
-            <a:r>
-              <a:rPr lang="en-US" sz="1000" dirty="0">
-                <a:solidFill>
-                  <a:srgbClr val="97A7AF"/>
-                </a:solidFill>
-                <a:latin typeface="Source Sans Pro" panose="020B0503030403020204" pitchFamily="34" charset="0"/>
-                <a:ea typeface="Source Sans Pro" panose="020B0503030403020204" pitchFamily="34" charset="0"/>
-              </a:rPr>
-              <a:t>resources)</a:t>
+              <a:t>(.java)</a:t>
             </a:r>
           </a:p>
         </p:txBody>
@@ -43325,13 +43310,12 @@
           </p:cNvPr>
           <p:cNvCxnSpPr>
             <a:cxnSpLocks/>
-            <a:stCxn id="118" idx="2"/>
           </p:cNvCxnSpPr>
           <p:nvPr/>
         </p:nvCxnSpPr>
         <p:spPr>
           <a:xfrm>
-            <a:off x="4158970" y="1781109"/>
+            <a:off x="4158763" y="1794973"/>
             <a:ext cx="0" cy="292448"/>
           </a:xfrm>
           <a:prstGeom prst="straightConnector1">
@@ -43373,7 +43357,7 @@
         </p:nvSpPr>
         <p:spPr>
           <a:xfrm>
-            <a:off x="5728433" y="3036151"/>
+            <a:off x="5728433" y="2996952"/>
             <a:ext cx="973343" cy="246221"/>
           </a:xfrm>
           <a:prstGeom prst="rect">
@@ -43574,13 +43558,12 @@
           </p:cNvPr>
           <p:cNvCxnSpPr>
             <a:cxnSpLocks/>
-            <a:stCxn id="116" idx="2"/>
           </p:cNvCxnSpPr>
           <p:nvPr/>
         </p:nvCxnSpPr>
         <p:spPr>
           <a:xfrm>
-            <a:off x="9113859" y="1790022"/>
+            <a:off x="9113859" y="1797079"/>
             <a:ext cx="11939" cy="1481488"/>
           </a:xfrm>
           <a:prstGeom prst="straightConnector1">
@@ -43668,7 +43651,7 @@
         </p:nvSpPr>
         <p:spPr>
           <a:xfrm>
-            <a:off x="9097187" y="2991684"/>
+            <a:off x="9097187" y="2996952"/>
             <a:ext cx="360996" cy="246221"/>
           </a:xfrm>
           <a:prstGeom prst="rect">
@@ -43806,7 +43789,7 @@
         </p:nvSpPr>
         <p:spPr>
           <a:xfrm>
-            <a:off x="9097187" y="1804336"/>
+            <a:off x="9097187" y="1124744"/>
             <a:ext cx="508473" cy="246221"/>
           </a:xfrm>
           <a:prstGeom prst="rect">
@@ -43941,13 +43924,12 @@
           </p:cNvPr>
           <p:cNvCxnSpPr>
             <a:cxnSpLocks/>
-            <a:stCxn id="102" idx="2"/>
           </p:cNvCxnSpPr>
           <p:nvPr/>
         </p:nvCxnSpPr>
         <p:spPr>
           <a:xfrm>
-            <a:off x="10786663" y="964985"/>
+            <a:off x="10786663" y="972042"/>
             <a:ext cx="0" cy="2306525"/>
           </a:xfrm>
           <a:prstGeom prst="straightConnector1">
@@ -43989,7 +43971,7 @@
         </p:nvSpPr>
         <p:spPr>
           <a:xfrm>
-            <a:off x="10776402" y="2991684"/>
+            <a:off x="10776402" y="2996952"/>
             <a:ext cx="354584" cy="246221"/>
           </a:xfrm>
           <a:prstGeom prst="rect">
@@ -44129,7 +44111,7 @@
         </p:nvCxnSpPr>
         <p:spPr>
           <a:xfrm>
-            <a:off x="4152752" y="2872198"/>
+            <a:off x="2495600" y="2867087"/>
             <a:ext cx="4666" cy="411480"/>
           </a:xfrm>
           <a:prstGeom prst="straightConnector1">
@@ -45663,7 +45645,7 @@
                 <a:ea typeface="Source Sans Pro" panose="020B0503030403020204" pitchFamily="34" charset="0"/>
                 <a:cs typeface="Source Sans Pro Light" charset="0"/>
               </a:rPr>
-              <a:t>Third Party ELF Linker</a:t>
+              <a:t>ELF Linker (Native Toolchain)</a:t>
             </a:r>
           </a:p>
         </p:txBody>
@@ -45726,7 +45708,21 @@
                 <a:ea typeface="Source Sans Pro" panose="020B0503030403020204" pitchFamily="34" charset="0"/>
                 <a:cs typeface="Source Sans Pro Light" charset="0"/>
               </a:rPr>
-              <a:t>Third Party C Compiler</a:t>
+              <a:t>C Compiler</a:t>
+            </a:r>
+          </a:p>
+          <a:p>
+            <a:pPr algn="ctr"/>
+            <a:r>
+              <a:rPr lang="en-US" sz="1000" dirty="0">
+                <a:solidFill>
+                  <a:srgbClr val="FFFFFF"/>
+                </a:solidFill>
+                <a:latin typeface="Source Sans Pro" panose="020B0503030403020204" pitchFamily="34" charset="0"/>
+                <a:ea typeface="Source Sans Pro" panose="020B0503030403020204" pitchFamily="34" charset="0"/>
+                <a:cs typeface="Source Sans Pro Light" charset="0"/>
+              </a:rPr>
+              <a:t>(Native Toolchain)</a:t>
             </a:r>
           </a:p>
         </p:txBody>
@@ -45875,7 +45871,7 @@
         </p:nvGrpSpPr>
         <p:grpSpPr>
           <a:xfrm>
-            <a:off x="4703468" y="4154767"/>
+            <a:off x="4697515" y="4157942"/>
             <a:ext cx="344751" cy="303135"/>
             <a:chOff x="3862697" y="4114169"/>
             <a:chExt cx="344751" cy="303135"/>
@@ -46570,7 +46566,7 @@
         </p:nvSpPr>
         <p:spPr>
           <a:xfrm>
-            <a:off x="5746447" y="1078271"/>
+            <a:off x="5746447" y="1124744"/>
             <a:ext cx="519553" cy="246221"/>
           </a:xfrm>
           <a:prstGeom prst="rect">
@@ -46705,13 +46701,12 @@
           </p:cNvPr>
           <p:cNvCxnSpPr>
             <a:cxnSpLocks/>
-            <a:stCxn id="9" idx="2"/>
           </p:cNvCxnSpPr>
           <p:nvPr/>
         </p:nvCxnSpPr>
         <p:spPr>
           <a:xfrm>
-            <a:off x="5769862" y="1781365"/>
+            <a:off x="5769655" y="1809491"/>
             <a:ext cx="5363" cy="277930"/>
           </a:xfrm>
           <a:prstGeom prst="straightConnector1">
@@ -47042,13 +47037,12 @@
           </p:cNvPr>
           <p:cNvCxnSpPr>
             <a:cxnSpLocks/>
-            <a:stCxn id="17" idx="2"/>
           </p:cNvCxnSpPr>
           <p:nvPr/>
         </p:nvCxnSpPr>
         <p:spPr>
           <a:xfrm>
-            <a:off x="7433524" y="967922"/>
+            <a:off x="7433317" y="956162"/>
             <a:ext cx="0" cy="1131259"/>
           </a:xfrm>
           <a:prstGeom prst="straightConnector1">
@@ -47406,7 +47400,7 @@
         </p:nvCxnSpPr>
         <p:spPr>
           <a:xfrm>
-            <a:off x="5732836" y="2861976"/>
+            <a:off x="5732836" y="2867087"/>
             <a:ext cx="4666" cy="411480"/>
           </a:xfrm>
           <a:prstGeom prst="straightConnector1">

</xml_diff>